<commit_message>
Implement Joris' tips on presentations
</commit_message>
<xml_diff>
--- a/julia,_good_back_ugly.pptx
+++ b/julia,_good_back_ugly.pptx
@@ -332,7 +332,7 @@
           <a:p>
             <a:fld id="{CC9F3EF1-84A5-42B0-81FF-8805AF740E8D}" type="datetimeFigureOut">
               <a:rPr lang="en-US" smtClean="0"/>
-              <a:t>2021-07-13</a:t>
+              <a:t>2021-08-05</a:t>
             </a:fld>
             <a:endParaRPr lang="en-US"/>
           </a:p>
@@ -746,7 +746,7 @@
           <a:p>
             <a:fld id="{0D45F18C-3E18-466F-8ADF-516304A44708}" type="datetime1">
               <a:rPr lang="en-US" smtClean="0"/>
-              <a:t>2021-07-13</a:t>
+              <a:t>2021-08-05</a:t>
             </a:fld>
             <a:endParaRPr lang="en-US"/>
           </a:p>
@@ -944,7 +944,7 @@
           <a:p>
             <a:fld id="{D5980222-6813-4CA6-84DC-753D8B88D809}" type="datetime1">
               <a:rPr lang="en-US" smtClean="0"/>
-              <a:t>2021-07-13</a:t>
+              <a:t>2021-08-05</a:t>
             </a:fld>
             <a:endParaRPr lang="en-US"/>
           </a:p>
@@ -1152,7 +1152,7 @@
           <a:p>
             <a:fld id="{96F7B8FF-A661-4CB7-BF06-F03D9C89262B}" type="datetime1">
               <a:rPr lang="en-US" smtClean="0"/>
-              <a:t>2021-07-13</a:t>
+              <a:t>2021-08-05</a:t>
             </a:fld>
             <a:endParaRPr lang="en-US"/>
           </a:p>
@@ -1350,7 +1350,7 @@
           <a:p>
             <a:fld id="{CE4E165D-6495-4D37-B27D-5DB6761319B2}" type="datetime1">
               <a:rPr lang="en-US" smtClean="0"/>
-              <a:t>2021-07-13</a:t>
+              <a:t>2021-08-05</a:t>
             </a:fld>
             <a:endParaRPr lang="en-US"/>
           </a:p>
@@ -1625,7 +1625,7 @@
           <a:p>
             <a:fld id="{579D02C7-69E9-4C82-8F80-CB6196DA722C}" type="datetime1">
               <a:rPr lang="en-US" smtClean="0"/>
-              <a:t>2021-07-13</a:t>
+              <a:t>2021-08-05</a:t>
             </a:fld>
             <a:endParaRPr lang="en-US"/>
           </a:p>
@@ -1890,7 +1890,7 @@
           <a:p>
             <a:fld id="{107E8C2C-E058-49BD-9DFF-244106208F3B}" type="datetime1">
               <a:rPr lang="en-US" smtClean="0"/>
-              <a:t>2021-07-13</a:t>
+              <a:t>2021-08-05</a:t>
             </a:fld>
             <a:endParaRPr lang="en-US"/>
           </a:p>
@@ -2302,7 +2302,7 @@
           <a:p>
             <a:fld id="{EBBE2EFD-4DA5-4354-BB09-551207F90777}" type="datetime1">
               <a:rPr lang="en-US" smtClean="0"/>
-              <a:t>2021-07-13</a:t>
+              <a:t>2021-08-05</a:t>
             </a:fld>
             <a:endParaRPr lang="en-US"/>
           </a:p>
@@ -2443,7 +2443,7 @@
           <a:p>
             <a:fld id="{0357F3B6-5D5B-4F6A-8ABC-6500847F3284}" type="datetime1">
               <a:rPr lang="en-US" smtClean="0"/>
-              <a:t>2021-07-13</a:t>
+              <a:t>2021-08-05</a:t>
             </a:fld>
             <a:endParaRPr lang="en-US"/>
           </a:p>
@@ -2556,7 +2556,7 @@
           <a:p>
             <a:fld id="{470EE9C1-5D95-4DE1-8B8E-CE731554AA23}" type="datetime1">
               <a:rPr lang="en-US" smtClean="0"/>
-              <a:t>2021-07-13</a:t>
+              <a:t>2021-08-05</a:t>
             </a:fld>
             <a:endParaRPr lang="en-US"/>
           </a:p>
@@ -2867,7 +2867,7 @@
           <a:p>
             <a:fld id="{ED4A0E8D-A460-4018-89F2-1FF6F9205C86}" type="datetime1">
               <a:rPr lang="en-US" smtClean="0"/>
-              <a:t>2021-07-13</a:t>
+              <a:t>2021-08-05</a:t>
             </a:fld>
             <a:endParaRPr lang="en-US"/>
           </a:p>
@@ -3155,7 +3155,7 @@
           <a:p>
             <a:fld id="{74076E25-3B53-45C6-AE55-8E3CC5E53EDE}" type="datetime1">
               <a:rPr lang="en-US" smtClean="0"/>
-              <a:t>2021-07-13</a:t>
+              <a:t>2021-08-05</a:t>
             </a:fld>
             <a:endParaRPr lang="en-US"/>
           </a:p>
@@ -3396,7 +3396,7 @@
           <a:p>
             <a:fld id="{3B0E2389-F93F-49F3-A6AD-79A456A600D1}" type="datetime1">
               <a:rPr lang="en-US" smtClean="0"/>
-              <a:t>2021-07-13</a:t>
+              <a:t>2021-08-05</a:t>
             </a:fld>
             <a:endParaRPr lang="en-US"/>
           </a:p>
@@ -4150,7 +4150,7 @@
             <a:r>
               <a:rPr lang="en-US" b="1" dirty="0">
                 <a:solidFill>
-                  <a:srgbClr val="FF0000"/>
+                  <a:srgbClr val="0070C0"/>
                 </a:solidFill>
                 <a:latin typeface="Consolas" panose="020B0609020204030204" pitchFamily="49" charset="0"/>
               </a:rPr>
@@ -14777,33 +14777,15 @@
                                   </p:childTnLst>
                                 </p:cTn>
                               </p:par>
-                            </p:childTnLst>
-                          </p:cTn>
-                        </p:par>
-                      </p:childTnLst>
-                    </p:cTn>
-                  </p:par>
-                  <p:par>
-                    <p:cTn id="43" fill="hold">
-                      <p:stCondLst>
-                        <p:cond delay="indefinite"/>
-                      </p:stCondLst>
-                      <p:childTnLst>
-                        <p:par>
-                          <p:cTn id="44" fill="hold">
-                            <p:stCondLst>
-                              <p:cond delay="0"/>
-                            </p:stCondLst>
-                            <p:childTnLst>
                               <p:par>
-                                <p:cTn id="45" presetID="1" presetClass="entr" presetSubtype="0" fill="hold" grpId="0" nodeType="clickEffect">
+                                <p:cTn id="43" presetID="1" presetClass="entr" presetSubtype="0" fill="hold" grpId="0" nodeType="withEffect">
                                   <p:stCondLst>
                                     <p:cond delay="0"/>
                                   </p:stCondLst>
                                   <p:childTnLst>
                                     <p:set>
                                       <p:cBhvr>
-                                        <p:cTn id="46" dur="1" fill="hold">
+                                        <p:cTn id="44" dur="1" fill="hold">
                                           <p:stCondLst>
                                             <p:cond delay="0"/>
                                           </p:stCondLst>
@@ -14829,26 +14811,26 @@
                     </p:cTn>
                   </p:par>
                   <p:par>
-                    <p:cTn id="47" fill="hold">
+                    <p:cTn id="45" fill="hold">
                       <p:stCondLst>
                         <p:cond delay="indefinite"/>
                       </p:stCondLst>
                       <p:childTnLst>
                         <p:par>
-                          <p:cTn id="48" fill="hold">
+                          <p:cTn id="46" fill="hold">
                             <p:stCondLst>
                               <p:cond delay="0"/>
                             </p:stCondLst>
                             <p:childTnLst>
                               <p:par>
-                                <p:cTn id="49" presetID="1" presetClass="entr" presetSubtype="0" fill="hold" grpId="0" nodeType="clickEffect">
+                                <p:cTn id="47" presetID="1" presetClass="entr" presetSubtype="0" fill="hold" grpId="0" nodeType="clickEffect">
                                   <p:stCondLst>
                                     <p:cond delay="0"/>
                                   </p:stCondLst>
                                   <p:childTnLst>
                                     <p:set>
                                       <p:cBhvr>
-                                        <p:cTn id="50" dur="1" fill="hold">
+                                        <p:cTn id="48" dur="1" fill="hold">
                                           <p:stCondLst>
                                             <p:cond delay="0"/>
                                           </p:stCondLst>
@@ -22204,7 +22186,7 @@
               <a:rPr lang="en-US" dirty="0">
                 <a:latin typeface="Consolas" panose="020B0609020204030204" pitchFamily="49" charset="0"/>
               </a:rPr>
-              <a:t>pixel = Pixel(3, 7, "green")</a:t>
+              <a:t>pixel = Pixel(3, 7, "blue")</a:t>
             </a:r>
           </a:p>
           <a:p>
@@ -22271,7 +22253,7 @@
               <a:rPr lang="en-US" dirty="0">
                 <a:latin typeface="Consolas" panose="020B0609020204030204" pitchFamily="49" charset="0"/>
               </a:rPr>
-              <a:t>paint = Paint("red")</a:t>
+              <a:t>paint = Paint("yellow")</a:t>
             </a:r>
           </a:p>
           <a:p>
@@ -22612,9 +22594,9 @@
         <p:grpSpPr>
           <a:xfrm>
             <a:off x="8336341" y="3020036"/>
-            <a:ext cx="1265348" cy="369332"/>
+            <a:ext cx="1144930" cy="369332"/>
             <a:chOff x="8336341" y="3020036"/>
-            <a:chExt cx="1265348" cy="369332"/>
+            <a:chExt cx="1144930" cy="369332"/>
           </a:xfrm>
         </p:grpSpPr>
         <p:sp>
@@ -22632,7 +22614,7 @@
           <p:spPr>
             <a:xfrm>
               <a:off x="8878221" y="3020036"/>
-              <a:ext cx="723468" cy="369332"/>
+              <a:ext cx="603050" cy="369332"/>
             </a:xfrm>
             <a:prstGeom prst="rect">
               <a:avLst/>
@@ -22653,7 +22635,7 @@
                     <a:schemeClr val="bg1"/>
                   </a:solidFill>
                 </a:rPr>
-                <a:t>green</a:t>
+                <a:t>blue</a:t>
               </a:r>
             </a:p>
           </p:txBody>
@@ -22820,9 +22802,9 @@
         <p:grpSpPr>
           <a:xfrm>
             <a:off x="8336341" y="5578194"/>
-            <a:ext cx="1047767" cy="369332"/>
+            <a:ext cx="1358301" cy="369332"/>
             <a:chOff x="8336341" y="5578194"/>
-            <a:chExt cx="1047767" cy="369332"/>
+            <a:chExt cx="1358301" cy="369332"/>
           </a:xfrm>
         </p:grpSpPr>
         <p:sp>
@@ -22840,7 +22822,7 @@
           <p:spPr>
             <a:xfrm>
               <a:off x="8881406" y="5578194"/>
-              <a:ext cx="502702" cy="369332"/>
+              <a:ext cx="813236" cy="369332"/>
             </a:xfrm>
             <a:prstGeom prst="rect">
               <a:avLst/>
@@ -22861,7 +22843,7 @@
                     <a:schemeClr val="bg1"/>
                   </a:solidFill>
                 </a:rPr>
-                <a:t>red</a:t>
+                <a:t>yellow</a:t>
               </a:r>
             </a:p>
           </p:txBody>
@@ -27938,13 +27920,18 @@
         </p:nvSpPr>
         <p:spPr/>
         <p:txBody>
-          <a:bodyPr/>
+          <a:bodyPr>
+            <a:normAutofit lnSpcReduction="10000"/>
+          </a:bodyPr>
           <a:lstStyle/>
           <a:p>
             <a:r>
               <a:rPr lang="en-US" dirty="0"/>
-              <a:t>Inline code fragments and file names are rendered as, e.g., </a:t>
-            </a:r>
+              <a:t>Inline code fragments and file names</a:t>
+            </a:r>
+            <a:br>
+              <a:rPr lang="en-US" dirty="0"/>
+            </a:br>
             <a:r>
               <a:rPr lang="en-US" dirty="0">
                 <a:latin typeface="Consolas" panose="020B0609020204030204" pitchFamily="49" charset="0"/>
@@ -27956,7 +27943,7 @@
           <a:p>
             <a:r>
               <a:rPr lang="en-US" dirty="0"/>
-              <a:t>Longer code fragments are rendered as</a:t>
+              <a:t>Longer code fragments</a:t>
             </a:r>
           </a:p>
           <a:p>
@@ -27976,7 +27963,19 @@
           <a:p>
             <a:r>
               <a:rPr lang="en-US" dirty="0"/>
-              <a:t>Data files are rendered as</a:t>
+              <a:t>Data files</a:t>
+            </a:r>
+          </a:p>
+          <a:p>
+            <a:endParaRPr lang="en-US" dirty="0"/>
+          </a:p>
+          <a:p>
+            <a:endParaRPr lang="en-US" dirty="0"/>
+          </a:p>
+          <a:p>
+            <a:r>
+              <a:rPr lang="en-US" dirty="0"/>
+              <a:t>Terminal output</a:t>
             </a:r>
             <a:endParaRPr lang="nl-BE" dirty="0"/>
           </a:p>
@@ -28053,7 +28052,7 @@
               </a:pPr>
               <a:t>4</a:t>
             </a:fld>
-            <a:endParaRPr kumimoji="0" lang="nl-BE" sz="1200" b="0" i="0" u="none" strike="noStrike" kern="1200" cap="none" spc="0" normalizeH="0" baseline="0" noProof="0">
+            <a:endParaRPr kumimoji="0" lang="nl-BE" sz="1200" b="0" i="0" u="none" strike="noStrike" kern="1200" cap="none" spc="0" normalizeH="0" baseline="0" noProof="0" dirty="0">
               <a:ln>
                 <a:noFill/>
               </a:ln>
@@ -28080,8 +28079,8 @@
         </p:nvSpPr>
         <p:spPr>
           <a:xfrm>
-            <a:off x="2855641" y="3137030"/>
-            <a:ext cx="5285421" cy="1200329"/>
+            <a:off x="1500968" y="3066404"/>
+            <a:ext cx="4527299" cy="923330"/>
           </a:xfrm>
           <a:prstGeom prst="rect">
             <a:avLst/>
@@ -28129,7 +28128,7 @@
                 <a:latin typeface="Consolas" panose="020B0609020204030204" pitchFamily="49" charset="0"/>
                 <a:cs typeface="Courier New" pitchFamily="49" charset="0"/>
               </a:rPr>
-              <a:t>#!/</a:t>
+              <a:t>#!/usr/bin/env </a:t>
             </a:r>
             <a:r>
               <a:rPr kumimoji="0" lang="en-US" sz="1800" b="0" i="0" u="none" strike="noStrike" kern="1200" cap="none" spc="0" normalizeH="0" baseline="0" noProof="0" dirty="0" err="1">
@@ -28145,56 +28144,21 @@
                 <a:latin typeface="Consolas" panose="020B0609020204030204" pitchFamily="49" charset="0"/>
                 <a:cs typeface="Courier New" pitchFamily="49" charset="0"/>
               </a:rPr>
-              <a:t>usr</a:t>
-            </a:r>
-            <a:r>
-              <a:rPr kumimoji="0" lang="en-US" sz="1800" b="0" i="0" u="none" strike="noStrike" kern="1200" cap="none" spc="0" normalizeH="0" baseline="0" noProof="0" dirty="0">
-                <a:ln>
-                  <a:noFill/>
-                </a:ln>
-                <a:solidFill>
-                  <a:prstClr val="black"/>
-                </a:solidFill>
-                <a:effectLst/>
-                <a:uLnTx/>
-                <a:uFillTx/>
-                <a:latin typeface="Consolas" panose="020B0609020204030204" pitchFamily="49" charset="0"/>
-                <a:cs typeface="Courier New" pitchFamily="49" charset="0"/>
-              </a:rPr>
-              <a:t>/bin/</a:t>
-            </a:r>
-            <a:r>
-              <a:rPr kumimoji="0" lang="en-US" sz="1800" b="0" i="0" u="none" strike="noStrike" kern="1200" cap="none" spc="0" normalizeH="0" baseline="0" noProof="0" dirty="0" err="1">
-                <a:ln>
-                  <a:noFill/>
-                </a:ln>
-                <a:solidFill>
-                  <a:prstClr val="black"/>
-                </a:solidFill>
-                <a:effectLst/>
-                <a:uLnTx/>
-                <a:uFillTx/>
-                <a:latin typeface="Consolas" panose="020B0609020204030204" pitchFamily="49" charset="0"/>
-                <a:cs typeface="Courier New" pitchFamily="49" charset="0"/>
-              </a:rPr>
-              <a:t>env</a:t>
-            </a:r>
-            <a:r>
-              <a:rPr kumimoji="0" lang="en-US" sz="1800" b="0" i="0" u="none" strike="noStrike" kern="1200" cap="none" spc="0" normalizeH="0" baseline="0" noProof="0" dirty="0">
-                <a:ln>
-                  <a:noFill/>
-                </a:ln>
-                <a:solidFill>
-                  <a:prstClr val="black"/>
-                </a:solidFill>
-                <a:effectLst/>
-                <a:uLnTx/>
-                <a:uFillTx/>
-                <a:latin typeface="Consolas" panose="020B0609020204030204" pitchFamily="49" charset="0"/>
-                <a:cs typeface="Courier New" pitchFamily="49" charset="0"/>
-              </a:rPr>
-              <a:t> python</a:t>
-            </a:r>
+              <a:t>julia</a:t>
+            </a:r>
+            <a:endParaRPr kumimoji="0" lang="en-US" sz="1800" b="0" i="0" u="none" strike="noStrike" kern="1200" cap="none" spc="0" normalizeH="0" baseline="0" noProof="0" dirty="0">
+              <a:ln>
+                <a:noFill/>
+              </a:ln>
+              <a:solidFill>
+                <a:prstClr val="black"/>
+              </a:solidFill>
+              <a:effectLst/>
+              <a:uLnTx/>
+              <a:uFillTx/>
+              <a:latin typeface="Consolas" panose="020B0609020204030204" pitchFamily="49" charset="0"/>
+              <a:cs typeface="Courier New" pitchFamily="49" charset="0"/>
+            </a:endParaRPr>
           </a:p>
           <a:p>
             <a:pPr marL="0" marR="0" lvl="0" indent="0" algn="l" defTabSz="914400" rtl="0" eaLnBrk="1" fontAlgn="auto" latinLnBrk="0" hangingPunct="1">
@@ -28232,6 +28196,48 @@
             </a:r>
           </a:p>
           <a:p>
+            <a:r>
+              <a:rPr lang="en-US" dirty="0" err="1">
+                <a:latin typeface="Consolas" panose="020B0609020204030204" pitchFamily="49" charset="0"/>
+              </a:rPr>
+              <a:t>linear_scale</a:t>
+            </a:r>
+            <a:r>
+              <a:rPr lang="en-US" dirty="0">
+                <a:latin typeface="Consolas" panose="020B0609020204030204" pitchFamily="49" charset="0"/>
+              </a:rPr>
+              <a:t>(x, a, b) = a*x + b</a:t>
+            </a:r>
+          </a:p>
+        </p:txBody>
+      </p:sp>
+      <p:sp>
+        <p:nvSpPr>
+          <p:cNvPr id="6" name="TextBox 5"/>
+          <p:cNvSpPr txBox="1"/>
+          <p:nvPr/>
+        </p:nvSpPr>
+        <p:spPr>
+          <a:xfrm>
+            <a:off x="1500968" y="4496272"/>
+            <a:ext cx="4527299" cy="830997"/>
+          </a:xfrm>
+          <a:prstGeom prst="rect">
+            <a:avLst/>
+          </a:prstGeom>
+          <a:solidFill>
+            <a:schemeClr val="accent6">
+              <a:lumMod val="20000"/>
+              <a:lumOff val="80000"/>
+            </a:schemeClr>
+          </a:solidFill>
+        </p:spPr>
+        <p:txBody>
+          <a:bodyPr wrap="square" rtlCol="0">
+            <a:spAutoFit/>
+          </a:bodyPr>
+          <a:lstStyle/>
+          <a:p>
             <a:pPr marL="0" marR="0" lvl="0" indent="0" algn="l" defTabSz="914400" rtl="0" eaLnBrk="1" fontAlgn="auto" latinLnBrk="0" hangingPunct="1">
               <a:lnSpc>
                 <a:spcPct val="100000"/>
@@ -28250,7 +28256,7 @@
               <a:defRPr/>
             </a:pPr>
             <a:r>
-              <a:rPr kumimoji="0" lang="en-US" sz="1800" b="0" i="0" u="none" strike="noStrike" kern="1200" cap="none" spc="0" normalizeH="0" baseline="0" noProof="0" dirty="0">
+              <a:rPr kumimoji="0" lang="en-US" sz="1600" b="0" i="0" u="none" strike="noStrike" kern="1200" cap="none" spc="0" normalizeH="0" baseline="0" noProof="0" dirty="0">
                 <a:ln>
                   <a:noFill/>
                 </a:ln>
@@ -28263,7 +28269,7 @@
                 <a:latin typeface="Consolas" panose="020B0609020204030204" pitchFamily="49" charset="0"/>
                 <a:cs typeface="Courier New" pitchFamily="49" charset="0"/>
               </a:rPr>
-              <a:t>if __name__ == '__main__':</a:t>
+              <a:t>case dim temp</a:t>
             </a:r>
           </a:p>
           <a:p>
@@ -28285,7 +28291,7 @@
               <a:defRPr/>
             </a:pPr>
             <a:r>
-              <a:rPr kumimoji="0" lang="en-US" sz="1800" b="0" i="0" u="none" strike="noStrike" kern="1200" cap="none" spc="0" normalizeH="0" baseline="0" noProof="0" dirty="0">
+              <a:rPr kumimoji="0" lang="en-US" sz="1600" b="0" i="0" u="none" strike="noStrike" kern="1200" cap="none" spc="0" normalizeH="0" baseline="0" noProof="0" dirty="0">
                 <a:ln>
                   <a:noFill/>
                 </a:ln>
@@ -28298,37 +28304,9 @@
                 <a:latin typeface="Consolas" panose="020B0609020204030204" pitchFamily="49" charset="0"/>
                 <a:cs typeface="Courier New" pitchFamily="49" charset="0"/>
               </a:rPr>
-              <a:t>    print('hello world!')</a:t>
-            </a:r>
-          </a:p>
-        </p:txBody>
-      </p:sp>
-      <p:sp>
-        <p:nvSpPr>
-          <p:cNvPr id="6" name="TextBox 5"/>
-          <p:cNvSpPr txBox="1"/>
-          <p:nvPr/>
-        </p:nvSpPr>
-        <p:spPr>
-          <a:xfrm>
-            <a:off x="2855640" y="4841414"/>
-            <a:ext cx="5285421" cy="1569660"/>
-          </a:xfrm>
-          <a:prstGeom prst="rect">
-            <a:avLst/>
-          </a:prstGeom>
-          <a:solidFill>
-            <a:schemeClr val="accent6">
-              <a:lumMod val="20000"/>
-              <a:lumOff val="80000"/>
-            </a:schemeClr>
-          </a:solidFill>
-        </p:spPr>
-        <p:txBody>
-          <a:bodyPr wrap="square" rtlCol="0">
-            <a:spAutoFit/>
-          </a:bodyPr>
-          <a:lstStyle/>
+              <a:t>1 1 -0.5</a:t>
+            </a:r>
+          </a:p>
           <a:p>
             <a:pPr marL="0" marR="0" lvl="0" indent="0" algn="l" defTabSz="914400" rtl="0" eaLnBrk="1" fontAlgn="auto" latinLnBrk="0" hangingPunct="1">
               <a:lnSpc>
@@ -28361,181 +28339,6 @@
                 <a:latin typeface="Consolas" panose="020B0609020204030204" pitchFamily="49" charset="0"/>
                 <a:cs typeface="Courier New" pitchFamily="49" charset="0"/>
               </a:rPr>
-              <a:t>case dim temp</a:t>
-            </a:r>
-          </a:p>
-          <a:p>
-            <a:pPr marL="0" marR="0" lvl="0" indent="0" algn="l" defTabSz="914400" rtl="0" eaLnBrk="1" fontAlgn="auto" latinLnBrk="0" hangingPunct="1">
-              <a:lnSpc>
-                <a:spcPct val="100000"/>
-              </a:lnSpc>
-              <a:spcBef>
-                <a:spcPts val="0"/>
-              </a:spcBef>
-              <a:spcAft>
-                <a:spcPts val="0"/>
-              </a:spcAft>
-              <a:buClrTx/>
-              <a:buSzTx/>
-              <a:buFontTx/>
-              <a:buNone/>
-              <a:tabLst/>
-              <a:defRPr/>
-            </a:pPr>
-            <a:r>
-              <a:rPr kumimoji="0" lang="en-US" sz="1600" b="0" i="0" u="none" strike="noStrike" kern="1200" cap="none" spc="0" normalizeH="0" baseline="0" noProof="0" dirty="0">
-                <a:ln>
-                  <a:noFill/>
-                </a:ln>
-                <a:solidFill>
-                  <a:prstClr val="black"/>
-                </a:solidFill>
-                <a:effectLst/>
-                <a:uLnTx/>
-                <a:uFillTx/>
-                <a:latin typeface="Consolas" panose="020B0609020204030204" pitchFamily="49" charset="0"/>
-                <a:cs typeface="Courier New" pitchFamily="49" charset="0"/>
-              </a:rPr>
-              <a:t>1 1 -0.5</a:t>
-            </a:r>
-          </a:p>
-          <a:p>
-            <a:pPr marL="0" marR="0" lvl="0" indent="0" algn="l" defTabSz="914400" rtl="0" eaLnBrk="1" fontAlgn="auto" latinLnBrk="0" hangingPunct="1">
-              <a:lnSpc>
-                <a:spcPct val="100000"/>
-              </a:lnSpc>
-              <a:spcBef>
-                <a:spcPts val="0"/>
-              </a:spcBef>
-              <a:spcAft>
-                <a:spcPts val="0"/>
-              </a:spcAft>
-              <a:buClrTx/>
-              <a:buSzTx/>
-              <a:buFontTx/>
-              <a:buNone/>
-              <a:tabLst/>
-              <a:defRPr/>
-            </a:pPr>
-            <a:r>
-              <a:rPr kumimoji="0" lang="en-US" sz="1600" b="0" i="0" u="none" strike="noStrike" kern="1200" cap="none" spc="0" normalizeH="0" baseline="0" noProof="0" dirty="0">
-                <a:ln>
-                  <a:noFill/>
-                </a:ln>
-                <a:solidFill>
-                  <a:prstClr val="black"/>
-                </a:solidFill>
-                <a:effectLst/>
-                <a:uLnTx/>
-                <a:uFillTx/>
-                <a:latin typeface="Consolas" panose="020B0609020204030204" pitchFamily="49" charset="0"/>
-                <a:cs typeface="Courier New" pitchFamily="49" charset="0"/>
-              </a:rPr>
-              <a:t>2 1 0.0</a:t>
-            </a:r>
-          </a:p>
-          <a:p>
-            <a:pPr marL="0" marR="0" lvl="0" indent="0" algn="l" defTabSz="914400" rtl="0" eaLnBrk="1" fontAlgn="auto" latinLnBrk="0" hangingPunct="1">
-              <a:lnSpc>
-                <a:spcPct val="100000"/>
-              </a:lnSpc>
-              <a:spcBef>
-                <a:spcPts val="0"/>
-              </a:spcBef>
-              <a:spcAft>
-                <a:spcPts val="0"/>
-              </a:spcAft>
-              <a:buClrTx/>
-              <a:buSzTx/>
-              <a:buFontTx/>
-              <a:buNone/>
-              <a:tabLst/>
-              <a:defRPr/>
-            </a:pPr>
-            <a:r>
-              <a:rPr kumimoji="0" lang="en-US" sz="1600" b="0" i="0" u="none" strike="noStrike" kern="1200" cap="none" spc="0" normalizeH="0" baseline="0" noProof="0" dirty="0">
-                <a:ln>
-                  <a:noFill/>
-                </a:ln>
-                <a:solidFill>
-                  <a:prstClr val="black"/>
-                </a:solidFill>
-                <a:effectLst/>
-                <a:uLnTx/>
-                <a:uFillTx/>
-                <a:latin typeface="Consolas" panose="020B0609020204030204" pitchFamily="49" charset="0"/>
-                <a:cs typeface="Courier New" pitchFamily="49" charset="0"/>
-              </a:rPr>
-              <a:t>3 1 0.5</a:t>
-            </a:r>
-          </a:p>
-          <a:p>
-            <a:pPr marL="0" marR="0" lvl="0" indent="0" algn="l" defTabSz="914400" rtl="0" eaLnBrk="1" fontAlgn="auto" latinLnBrk="0" hangingPunct="1">
-              <a:lnSpc>
-                <a:spcPct val="100000"/>
-              </a:lnSpc>
-              <a:spcBef>
-                <a:spcPts val="0"/>
-              </a:spcBef>
-              <a:spcAft>
-                <a:spcPts val="0"/>
-              </a:spcAft>
-              <a:buClrTx/>
-              <a:buSzTx/>
-              <a:buFontTx/>
-              <a:buNone/>
-              <a:tabLst/>
-              <a:defRPr/>
-            </a:pPr>
-            <a:r>
-              <a:rPr kumimoji="0" lang="en-US" sz="1600" b="0" i="0" u="none" strike="noStrike" kern="1200" cap="none" spc="0" normalizeH="0" baseline="0" noProof="0" dirty="0">
-                <a:ln>
-                  <a:noFill/>
-                </a:ln>
-                <a:solidFill>
-                  <a:prstClr val="black"/>
-                </a:solidFill>
-                <a:effectLst/>
-                <a:uLnTx/>
-                <a:uFillTx/>
-                <a:latin typeface="Consolas" panose="020B0609020204030204" pitchFamily="49" charset="0"/>
-                <a:cs typeface="Courier New" pitchFamily="49" charset="0"/>
-              </a:rPr>
-              <a:t>4 2 -0.5</a:t>
-            </a:r>
-          </a:p>
-          <a:p>
-            <a:pPr marL="0" marR="0" lvl="0" indent="0" algn="l" defTabSz="914400" rtl="0" eaLnBrk="1" fontAlgn="auto" latinLnBrk="0" hangingPunct="1">
-              <a:lnSpc>
-                <a:spcPct val="100000"/>
-              </a:lnSpc>
-              <a:spcBef>
-                <a:spcPts val="0"/>
-              </a:spcBef>
-              <a:spcAft>
-                <a:spcPts val="0"/>
-              </a:spcAft>
-              <a:buClrTx/>
-              <a:buSzTx/>
-              <a:buFontTx/>
-              <a:buNone/>
-              <a:tabLst/>
-              <a:defRPr/>
-            </a:pPr>
-            <a:r>
-              <a:rPr kumimoji="0" lang="en-US" sz="1600" b="0" i="0" u="none" strike="noStrike" kern="1200" cap="none" spc="0" normalizeH="0" baseline="0" noProof="0" dirty="0">
-                <a:ln>
-                  <a:noFill/>
-                </a:ln>
-                <a:solidFill>
-                  <a:prstClr val="black"/>
-                </a:solidFill>
-                <a:effectLst/>
-                <a:uLnTx/>
-                <a:uFillTx/>
-                <a:latin typeface="Consolas" panose="020B0609020204030204" pitchFamily="49" charset="0"/>
-                <a:cs typeface="Courier New" pitchFamily="49" charset="0"/>
-              </a:rPr>
               <a:t>…</a:t>
             </a:r>
           </a:p>
@@ -28549,10 +28352,10 @@
         </p:nvGrpSpPr>
         <p:grpSpPr>
           <a:xfrm>
-            <a:off x="2845250" y="3484460"/>
-            <a:ext cx="3564285" cy="2926615"/>
-            <a:chOff x="1321249" y="3584213"/>
-            <a:chExt cx="3564285" cy="2926615"/>
+            <a:off x="1450169" y="3464592"/>
+            <a:ext cx="3553895" cy="1862677"/>
+            <a:chOff x="1331639" y="4648151"/>
+            <a:chExt cx="3553895" cy="1862677"/>
           </a:xfrm>
         </p:grpSpPr>
         <p:sp>
@@ -28572,7 +28375,7 @@
             <a:noFill/>
             <a:ln>
               <a:solidFill>
-                <a:srgbClr val="C00000"/>
+                <a:schemeClr val="tx1"/>
               </a:solidFill>
             </a:ln>
           </p:spPr>
@@ -28649,7 +28452,7 @@
             </a:prstGeom>
             <a:ln w="28575">
               <a:solidFill>
-                <a:srgbClr val="C00000"/>
+                <a:schemeClr val="tx1"/>
               </a:solidFill>
               <a:tailEnd type="stealth" w="lg" len="lg"/>
             </a:ln>
@@ -28688,7 +28491,7 @@
             </a:solidFill>
             <a:ln w="19050">
               <a:solidFill>
-                <a:srgbClr val="C00000"/>
+                <a:schemeClr val="tx1"/>
               </a:solidFill>
             </a:ln>
           </p:spPr>
@@ -28790,7 +28593,7 @@
           </p:nvSpPr>
           <p:spPr>
             <a:xfrm>
-              <a:off x="1321249" y="3584213"/>
+              <a:off x="1370847" y="4648151"/>
               <a:ext cx="360041" cy="273516"/>
             </a:xfrm>
             <a:prstGeom prst="ellipse">
@@ -28799,7 +28602,7 @@
             <a:noFill/>
             <a:ln>
               <a:solidFill>
-                <a:srgbClr val="C00000"/>
+                <a:schemeClr val="tx1"/>
               </a:solidFill>
             </a:ln>
           </p:spPr>
@@ -28868,15 +28671,15 @@
           </p:nvCxnSpPr>
           <p:spPr>
             <a:xfrm flipH="1" flipV="1">
-              <a:off x="1681290" y="3720971"/>
-              <a:ext cx="2026614" cy="2137601"/>
+              <a:off x="1730888" y="4784909"/>
+              <a:ext cx="1977016" cy="1073663"/>
             </a:xfrm>
             <a:prstGeom prst="straightConnector1">
               <a:avLst/>
             </a:prstGeom>
             <a:ln w="28575">
               <a:solidFill>
-                <a:srgbClr val="C00000"/>
+                <a:schemeClr val="tx1"/>
               </a:solidFill>
               <a:tailEnd type="stealth" w="lg" len="lg"/>
             </a:ln>
@@ -28896,6 +28699,310 @@
             </a:fontRef>
           </p:style>
         </p:cxnSp>
+      </p:grpSp>
+      <p:grpSp>
+        <p:nvGrpSpPr>
+          <p:cNvPr id="13" name="Group 12">
+            <a:extLst>
+              <a:ext uri="{FF2B5EF4-FFF2-40B4-BE49-F238E27FC236}">
+                <a16:creationId xmlns:a16="http://schemas.microsoft.com/office/drawing/2014/main" id="{F8D536DF-3965-4A28-AFA6-5D4AA896A9DC}"/>
+              </a:ext>
+            </a:extLst>
+          </p:cNvPr>
+          <p:cNvGrpSpPr/>
+          <p:nvPr/>
+        </p:nvGrpSpPr>
+        <p:grpSpPr>
+          <a:xfrm>
+            <a:off x="1500968" y="5893504"/>
+            <a:ext cx="2624380" cy="369332"/>
+            <a:chOff x="3423873" y="4938616"/>
+            <a:chExt cx="2624380" cy="369332"/>
+          </a:xfrm>
+        </p:grpSpPr>
+        <p:sp>
+          <p:nvSpPr>
+            <p:cNvPr id="15" name="TextBox 14">
+              <a:extLst>
+                <a:ext uri="{FF2B5EF4-FFF2-40B4-BE49-F238E27FC236}">
+                  <a16:creationId xmlns:a16="http://schemas.microsoft.com/office/drawing/2014/main" id="{DBCEB4B5-1EF9-45D6-A594-89448F1C8F61}"/>
+                </a:ext>
+              </a:extLst>
+            </p:cNvPr>
+            <p:cNvSpPr txBox="1"/>
+            <p:nvPr/>
+          </p:nvSpPr>
+          <p:spPr>
+            <a:xfrm>
+              <a:off x="3962041" y="4938616"/>
+              <a:ext cx="2086212" cy="369332"/>
+            </a:xfrm>
+            <a:prstGeom prst="rect">
+              <a:avLst/>
+            </a:prstGeom>
+            <a:solidFill>
+              <a:schemeClr val="tx1"/>
+            </a:solidFill>
+          </p:spPr>
+          <p:txBody>
+            <a:bodyPr wrap="none" rtlCol="0">
+              <a:spAutoFit/>
+            </a:bodyPr>
+            <a:lstStyle/>
+            <a:p>
+              <a:r>
+                <a:rPr lang="en-US" b="1" dirty="0">
+                  <a:solidFill>
+                    <a:schemeClr val="bg1"/>
+                  </a:solidFill>
+                </a:rPr>
+                <a:t>5 is an integer value</a:t>
+              </a:r>
+            </a:p>
+          </p:txBody>
+        </p:sp>
+        <p:cxnSp>
+          <p:nvCxnSpPr>
+            <p:cNvPr id="16" name="Straight Arrow Connector 15">
+              <a:extLst>
+                <a:ext uri="{FF2B5EF4-FFF2-40B4-BE49-F238E27FC236}">
+                  <a16:creationId xmlns:a16="http://schemas.microsoft.com/office/drawing/2014/main" id="{93E197DB-5492-49B2-947A-BAB28E19F840}"/>
+                </a:ext>
+              </a:extLst>
+            </p:cNvPr>
+            <p:cNvCxnSpPr/>
+            <p:nvPr/>
+          </p:nvCxnSpPr>
+          <p:spPr>
+            <a:xfrm>
+              <a:off x="3423873" y="5131384"/>
+              <a:ext cx="395417" cy="0"/>
+            </a:xfrm>
+            <a:prstGeom prst="straightConnector1">
+              <a:avLst/>
+            </a:prstGeom>
+            <a:ln w="38100">
+              <a:solidFill>
+                <a:schemeClr val="tx1"/>
+              </a:solidFill>
+              <a:tailEnd type="stealth" w="lg" len="lg"/>
+            </a:ln>
+          </p:spPr>
+          <p:style>
+            <a:lnRef idx="1">
+              <a:schemeClr val="accent1"/>
+            </a:lnRef>
+            <a:fillRef idx="0">
+              <a:schemeClr val="accent1"/>
+            </a:fillRef>
+            <a:effectRef idx="0">
+              <a:schemeClr val="accent1"/>
+            </a:effectRef>
+            <a:fontRef idx="minor">
+              <a:schemeClr val="tx1"/>
+            </a:fontRef>
+          </p:style>
+        </p:cxnSp>
+      </p:grpSp>
+      <p:grpSp>
+        <p:nvGrpSpPr>
+          <p:cNvPr id="17" name="Group 16">
+            <a:extLst>
+              <a:ext uri="{FF2B5EF4-FFF2-40B4-BE49-F238E27FC236}">
+                <a16:creationId xmlns:a16="http://schemas.microsoft.com/office/drawing/2014/main" id="{12202E39-E6C7-48B5-BD9A-377A45DA1F0F}"/>
+              </a:ext>
+            </a:extLst>
+          </p:cNvPr>
+          <p:cNvGrpSpPr/>
+          <p:nvPr/>
+        </p:nvGrpSpPr>
+        <p:grpSpPr>
+          <a:xfrm>
+            <a:off x="8102183" y="3371677"/>
+            <a:ext cx="2546549" cy="1098252"/>
+            <a:chOff x="7234137" y="3063682"/>
+            <a:chExt cx="2546549" cy="1098252"/>
+          </a:xfrm>
+        </p:grpSpPr>
+        <p:sp>
+          <p:nvSpPr>
+            <p:cNvPr id="18" name="TextBox 17">
+              <a:extLst>
+                <a:ext uri="{FF2B5EF4-FFF2-40B4-BE49-F238E27FC236}">
+                  <a16:creationId xmlns:a16="http://schemas.microsoft.com/office/drawing/2014/main" id="{187809B2-CA64-4CCB-A37A-BA6CAD514A90}"/>
+                </a:ext>
+              </a:extLst>
+            </p:cNvPr>
+            <p:cNvSpPr txBox="1"/>
+            <p:nvPr/>
+          </p:nvSpPr>
+          <p:spPr>
+            <a:xfrm>
+              <a:off x="7850221" y="3700269"/>
+              <a:ext cx="1930465" cy="461665"/>
+            </a:xfrm>
+            <a:prstGeom prst="rect">
+              <a:avLst/>
+            </a:prstGeom>
+            <a:noFill/>
+            <a:ln>
+              <a:solidFill>
+                <a:schemeClr val="tx1"/>
+              </a:solidFill>
+            </a:ln>
+          </p:spPr>
+          <p:txBody>
+            <a:bodyPr wrap="none" rtlCol="0">
+              <a:spAutoFit/>
+            </a:bodyPr>
+            <a:lstStyle/>
+            <a:p>
+              <a:r>
+                <a:rPr lang="en-US" sz="2400" dirty="0"/>
+                <a:t>Good practice</a:t>
+              </a:r>
+            </a:p>
+          </p:txBody>
+        </p:sp>
+        <p:pic>
+          <p:nvPicPr>
+            <p:cNvPr id="19" name="Graphic 18" descr="Thumbs up sign with solid fill">
+              <a:extLst>
+                <a:ext uri="{FF2B5EF4-FFF2-40B4-BE49-F238E27FC236}">
+                  <a16:creationId xmlns:a16="http://schemas.microsoft.com/office/drawing/2014/main" id="{EAB252DE-A3BF-4DD7-9C2B-DC40605ACD78}"/>
+                </a:ext>
+              </a:extLst>
+            </p:cNvPr>
+            <p:cNvPicPr>
+              <a:picLocks noChangeAspect="1"/>
+            </p:cNvPicPr>
+            <p:nvPr/>
+          </p:nvPicPr>
+          <p:blipFill>
+            <a:blip r:embed="rId2">
+              <a:extLst>
+                <a:ext uri="{28A0092B-C50C-407E-A947-70E740481C1C}">
+                  <a14:useLocalDpi xmlns:a14="http://schemas.microsoft.com/office/drawing/2010/main" val="0"/>
+                </a:ext>
+                <a:ext uri="{96DAC541-7B7A-43D3-8B79-37D633B846F1}">
+                  <asvg:svgBlip xmlns:asvg="http://schemas.microsoft.com/office/drawing/2016/SVG/main" r:embed="rId3"/>
+                </a:ext>
+              </a:extLst>
+            </a:blip>
+            <a:stretch>
+              <a:fillRect/>
+            </a:stretch>
+          </p:blipFill>
+          <p:spPr>
+            <a:xfrm>
+              <a:off x="7234137" y="3063682"/>
+              <a:ext cx="914400" cy="914400"/>
+            </a:xfrm>
+            <a:prstGeom prst="rect">
+              <a:avLst/>
+            </a:prstGeom>
+          </p:spPr>
+        </p:pic>
+      </p:grpSp>
+      <p:grpSp>
+        <p:nvGrpSpPr>
+          <p:cNvPr id="20" name="Group 19">
+            <a:extLst>
+              <a:ext uri="{FF2B5EF4-FFF2-40B4-BE49-F238E27FC236}">
+                <a16:creationId xmlns:a16="http://schemas.microsoft.com/office/drawing/2014/main" id="{87D862F7-D927-4686-8EA4-0A763A231753}"/>
+              </a:ext>
+            </a:extLst>
+          </p:cNvPr>
+          <p:cNvGrpSpPr/>
+          <p:nvPr/>
+        </p:nvGrpSpPr>
+        <p:grpSpPr>
+          <a:xfrm>
+            <a:off x="8718267" y="4668068"/>
+            <a:ext cx="2575214" cy="1112578"/>
+            <a:chOff x="7767368" y="2617720"/>
+            <a:chExt cx="2575214" cy="1112578"/>
+          </a:xfrm>
+        </p:grpSpPr>
+        <p:sp>
+          <p:nvSpPr>
+            <p:cNvPr id="21" name="TextBox 20">
+              <a:extLst>
+                <a:ext uri="{FF2B5EF4-FFF2-40B4-BE49-F238E27FC236}">
+                  <a16:creationId xmlns:a16="http://schemas.microsoft.com/office/drawing/2014/main" id="{08399BBA-C4BA-455E-A6AB-60E0547EF31E}"/>
+                </a:ext>
+              </a:extLst>
+            </p:cNvPr>
+            <p:cNvSpPr txBox="1"/>
+            <p:nvPr/>
+          </p:nvSpPr>
+          <p:spPr>
+            <a:xfrm>
+              <a:off x="7767368" y="2617720"/>
+              <a:ext cx="1930465" cy="461665"/>
+            </a:xfrm>
+            <a:prstGeom prst="rect">
+              <a:avLst/>
+            </a:prstGeom>
+            <a:noFill/>
+            <a:ln>
+              <a:solidFill>
+                <a:schemeClr val="tx1"/>
+              </a:solidFill>
+            </a:ln>
+          </p:spPr>
+          <p:txBody>
+            <a:bodyPr wrap="square" rtlCol="0">
+              <a:spAutoFit/>
+            </a:bodyPr>
+            <a:lstStyle/>
+            <a:p>
+              <a:r>
+                <a:rPr lang="en-US" sz="2400" dirty="0"/>
+                <a:t>Bad practice </a:t>
+              </a:r>
+            </a:p>
+          </p:txBody>
+        </p:sp>
+        <p:pic>
+          <p:nvPicPr>
+            <p:cNvPr id="22" name="Graphic 21" descr="Thumbs Down with solid fill">
+              <a:extLst>
+                <a:ext uri="{FF2B5EF4-FFF2-40B4-BE49-F238E27FC236}">
+                  <a16:creationId xmlns:a16="http://schemas.microsoft.com/office/drawing/2014/main" id="{89C7BFEA-CF28-4152-934F-DEB34A905F3D}"/>
+                </a:ext>
+              </a:extLst>
+            </p:cNvPr>
+            <p:cNvPicPr>
+              <a:picLocks noChangeAspect="1"/>
+            </p:cNvPicPr>
+            <p:nvPr/>
+          </p:nvPicPr>
+          <p:blipFill>
+            <a:blip r:embed="rId4">
+              <a:extLst>
+                <a:ext uri="{28A0092B-C50C-407E-A947-70E740481C1C}">
+                  <a14:useLocalDpi xmlns:a14="http://schemas.microsoft.com/office/drawing/2010/main" val="0"/>
+                </a:ext>
+                <a:ext uri="{96DAC541-7B7A-43D3-8B79-37D633B846F1}">
+                  <asvg:svgBlip xmlns:asvg="http://schemas.microsoft.com/office/drawing/2016/SVG/main" r:embed="rId5"/>
+                </a:ext>
+              </a:extLst>
+            </a:blip>
+            <a:stretch>
+              <a:fillRect/>
+            </a:stretch>
+          </p:blipFill>
+          <p:spPr>
+            <a:xfrm>
+              <a:off x="9428182" y="2815898"/>
+              <a:ext cx="914400" cy="914400"/>
+            </a:xfrm>
+            <a:prstGeom prst="rect">
+              <a:avLst/>
+            </a:prstGeom>
+          </p:spPr>
+        </p:pic>
       </p:grpSp>
     </p:spTree>
     <p:extLst>
@@ -29146,6 +29253,172 @@
                                         </p:cTn>
                                         <p:tgtEl>
                                           <p:spTgt spid="14"/>
+                                        </p:tgtEl>
+                                        <p:attrNameLst>
+                                          <p:attrName>style.visibility</p:attrName>
+                                        </p:attrNameLst>
+                                      </p:cBhvr>
+                                      <p:to>
+                                        <p:strVal val="visible"/>
+                                      </p:to>
+                                    </p:set>
+                                  </p:childTnLst>
+                                </p:cTn>
+                              </p:par>
+                            </p:childTnLst>
+                          </p:cTn>
+                        </p:par>
+                      </p:childTnLst>
+                    </p:cTn>
+                  </p:par>
+                  <p:par>
+                    <p:cTn id="23" fill="hold">
+                      <p:stCondLst>
+                        <p:cond delay="indefinite"/>
+                      </p:stCondLst>
+                      <p:childTnLst>
+                        <p:par>
+                          <p:cTn id="24" fill="hold">
+                            <p:stCondLst>
+                              <p:cond delay="0"/>
+                            </p:stCondLst>
+                            <p:childTnLst>
+                              <p:par>
+                                <p:cTn id="25" presetID="1" presetClass="entr" presetSubtype="0" fill="hold" grpId="0" nodeType="clickEffect">
+                                  <p:stCondLst>
+                                    <p:cond delay="0"/>
+                                  </p:stCondLst>
+                                  <p:childTnLst>
+                                    <p:set>
+                                      <p:cBhvr>
+                                        <p:cTn id="26" dur="1" fill="hold">
+                                          <p:stCondLst>
+                                            <p:cond delay="0"/>
+                                          </p:stCondLst>
+                                        </p:cTn>
+                                        <p:tgtEl>
+                                          <p:spTgt spid="3">
+                                            <p:txEl>
+                                              <p:pRg st="7" end="7"/>
+                                            </p:txEl>
+                                          </p:spTgt>
+                                        </p:tgtEl>
+                                        <p:attrNameLst>
+                                          <p:attrName>style.visibility</p:attrName>
+                                        </p:attrNameLst>
+                                      </p:cBhvr>
+                                      <p:to>
+                                        <p:strVal val="visible"/>
+                                      </p:to>
+                                    </p:set>
+                                  </p:childTnLst>
+                                </p:cTn>
+                              </p:par>
+                              <p:par>
+                                <p:cTn id="27" presetID="1" presetClass="entr" presetSubtype="0" fill="hold" nodeType="withEffect">
+                                  <p:stCondLst>
+                                    <p:cond delay="0"/>
+                                  </p:stCondLst>
+                                  <p:childTnLst>
+                                    <p:set>
+                                      <p:cBhvr>
+                                        <p:cTn id="28" dur="1" fill="hold">
+                                          <p:stCondLst>
+                                            <p:cond delay="0"/>
+                                          </p:stCondLst>
+                                        </p:cTn>
+                                        <p:tgtEl>
+                                          <p:spTgt spid="13"/>
+                                        </p:tgtEl>
+                                        <p:attrNameLst>
+                                          <p:attrName>style.visibility</p:attrName>
+                                        </p:attrNameLst>
+                                      </p:cBhvr>
+                                      <p:to>
+                                        <p:strVal val="visible"/>
+                                      </p:to>
+                                    </p:set>
+                                  </p:childTnLst>
+                                </p:cTn>
+                              </p:par>
+                            </p:childTnLst>
+                          </p:cTn>
+                        </p:par>
+                      </p:childTnLst>
+                    </p:cTn>
+                  </p:par>
+                  <p:par>
+                    <p:cTn id="29" fill="hold">
+                      <p:stCondLst>
+                        <p:cond delay="indefinite"/>
+                      </p:stCondLst>
+                      <p:childTnLst>
+                        <p:par>
+                          <p:cTn id="30" fill="hold">
+                            <p:stCondLst>
+                              <p:cond delay="0"/>
+                            </p:stCondLst>
+                            <p:childTnLst>
+                              <p:par>
+                                <p:cTn id="31" presetID="1" presetClass="entr" presetSubtype="0" fill="hold" nodeType="clickEffect">
+                                  <p:stCondLst>
+                                    <p:cond delay="0"/>
+                                  </p:stCondLst>
+                                  <p:childTnLst>
+                                    <p:set>
+                                      <p:cBhvr>
+                                        <p:cTn id="32" dur="1" fill="hold">
+                                          <p:stCondLst>
+                                            <p:cond delay="0"/>
+                                          </p:stCondLst>
+                                        </p:cTn>
+                                        <p:tgtEl>
+                                          <p:spTgt spid="17"/>
+                                        </p:tgtEl>
+                                        <p:attrNameLst>
+                                          <p:attrName>style.visibility</p:attrName>
+                                        </p:attrNameLst>
+                                      </p:cBhvr>
+                                      <p:to>
+                                        <p:strVal val="visible"/>
+                                      </p:to>
+                                    </p:set>
+                                  </p:childTnLst>
+                                </p:cTn>
+                              </p:par>
+                            </p:childTnLst>
+                          </p:cTn>
+                        </p:par>
+                      </p:childTnLst>
+                    </p:cTn>
+                  </p:par>
+                  <p:par>
+                    <p:cTn id="33" fill="hold">
+                      <p:stCondLst>
+                        <p:cond delay="indefinite"/>
+                      </p:stCondLst>
+                      <p:childTnLst>
+                        <p:par>
+                          <p:cTn id="34" fill="hold">
+                            <p:stCondLst>
+                              <p:cond delay="0"/>
+                            </p:stCondLst>
+                            <p:childTnLst>
+                              <p:par>
+                                <p:cTn id="35" presetID="1" presetClass="entr" presetSubtype="0" fill="hold" nodeType="clickEffect">
+                                  <p:stCondLst>
+                                    <p:cond delay="0"/>
+                                  </p:stCondLst>
+                                  <p:childTnLst>
+                                    <p:set>
+                                      <p:cBhvr>
+                                        <p:cTn id="36" dur="1" fill="hold">
+                                          <p:stCondLst>
+                                            <p:cond delay="0"/>
+                                          </p:stCondLst>
+                                        </p:cTn>
+                                        <p:tgtEl>
+                                          <p:spTgt spid="20"/>
                                         </p:tgtEl>
                                         <p:attrNameLst>
                                           <p:attrName>style.visibility</p:attrName>
@@ -30316,7 +30589,7 @@
               <a:rPr lang="en-US" dirty="0" err="1">
                 <a:latin typeface="Consolas" panose="020B0609020204030204" pitchFamily="49" charset="0"/>
               </a:rPr>
-              <a:t>Argparse</a:t>
+              <a:t>ArgParse</a:t>
             </a:r>
             <a:r>
               <a:rPr lang="en-US" dirty="0"/>

</xml_diff>